<commit_message>
Added introductions to the API specs
Added introductions to the API specs.

Alphabetically re-organised the participant sections in the Appendix.
</commit_message>
<xml_diff>
--- a/er/resources/Figures.pptx
+++ b/er/resources/Figures.pptx
@@ -6,6 +6,7 @@
   </p:sldMasterIdLst>
   <p:sldIdLst>
     <p:sldId id="256" r:id="rId2"/>
+    <p:sldId id="257" r:id="rId3"/>
   </p:sldIdLst>
   <p:sldSz cx="12192000" cy="6858000"/>
   <p:notesSz cx="6858000" cy="9144000"/>
@@ -104,6 +105,11 @@
       </a:defRPr>
     </a:lvl9pPr>
   </p:defaultTextStyle>
+  <p:extLst>
+    <p:ext uri="{EFAFB233-063F-42B5-8137-9DF3F51BA10A}">
+      <p15:sldGuideLst xmlns:p15="http://schemas.microsoft.com/office/powerpoint/2012/main"/>
+    </p:ext>
+  </p:extLst>
 </p:presentation>
 </file>
 
@@ -877,7 +883,7 @@
         <a:p>
           <a:r>
             <a:rPr lang="en-US" dirty="0"/>
-            <a:t>Warning</a:t>
+            <a:t>Preparedness</a:t>
           </a:r>
         </a:p>
       </dgm:t>
@@ -894,42 +900,6 @@
       </dgm:t>
     </dgm:pt>
     <dgm:pt modelId="{46DB9A69-0CBC-ED49-AF25-E8862FB25D62}" type="sibTrans" cxnId="{89262C76-2BE0-AA4F-AD51-33E1838DCEE8}">
-      <dgm:prSet/>
-      <dgm:spPr/>
-      <dgm:t>
-        <a:bodyPr/>
-        <a:lstStyle/>
-        <a:p>
-          <a:endParaRPr lang="en-US"/>
-        </a:p>
-      </dgm:t>
-    </dgm:pt>
-    <dgm:pt modelId="{5BC1A5C8-0A18-B14E-8794-80C61DADE11D}">
-      <dgm:prSet phldrT="[Text]"/>
-      <dgm:spPr/>
-      <dgm:t>
-        <a:bodyPr/>
-        <a:lstStyle/>
-        <a:p>
-          <a:r>
-            <a:rPr lang="en-US" dirty="0"/>
-            <a:t>Event</a:t>
-          </a:r>
-        </a:p>
-      </dgm:t>
-    </dgm:pt>
-    <dgm:pt modelId="{F9316EC7-31FE-5B40-9536-153D2F7DFA04}" type="parTrans" cxnId="{ADA38BE6-5C1D-3244-8595-0E38D76A6E6F}">
-      <dgm:prSet/>
-      <dgm:spPr/>
-      <dgm:t>
-        <a:bodyPr/>
-        <a:lstStyle/>
-        <a:p>
-          <a:endParaRPr lang="en-US"/>
-        </a:p>
-      </dgm:t>
-    </dgm:pt>
-    <dgm:pt modelId="{A8080CA6-9EB8-2B4B-A6DE-059A8AC104D7}" type="sibTrans" cxnId="{ADA38BE6-5C1D-3244-8595-0E38D76A6E6F}">
       <dgm:prSet/>
       <dgm:spPr/>
       <dgm:t>
@@ -985,7 +955,7 @@
         <a:p>
           <a:r>
             <a:rPr lang="en-US" dirty="0"/>
-            <a:t>Recovery &amp; Assessment</a:t>
+            <a:t>Recovery</a:t>
           </a:r>
         </a:p>
       </dgm:t>
@@ -1062,7 +1032,7 @@
       <dgm:spPr/>
     </dgm:pt>
     <dgm:pt modelId="{553E1117-A267-9443-9223-EEBC6F53ED3E}" type="pres">
-      <dgm:prSet presAssocID="{8E718B6B-40DE-A44D-A489-81C09F33CFD3}" presName="node" presStyleLbl="revTx" presStyleIdx="0" presStyleCnt="5">
+      <dgm:prSet presAssocID="{8E718B6B-40DE-A44D-A489-81C09F33CFD3}" presName="node" presStyleLbl="revTx" presStyleIdx="0" presStyleCnt="4">
         <dgm:presLayoutVars>
           <dgm:bulletEnabled val="1"/>
         </dgm:presLayoutVars>
@@ -1070,23 +1040,7 @@
       <dgm:spPr/>
     </dgm:pt>
     <dgm:pt modelId="{02F02D4F-0F07-9944-B84B-74C90483ACE7}" type="pres">
-      <dgm:prSet presAssocID="{46DB9A69-0CBC-ED49-AF25-E8862FB25D62}" presName="sibTrans" presStyleLbl="node1" presStyleIdx="0" presStyleCnt="5"/>
-      <dgm:spPr/>
-    </dgm:pt>
-    <dgm:pt modelId="{34356846-7B9F-074C-B88D-6972027ED9CD}" type="pres">
-      <dgm:prSet presAssocID="{5BC1A5C8-0A18-B14E-8794-80C61DADE11D}" presName="dummy" presStyleCnt="0"/>
-      <dgm:spPr/>
-    </dgm:pt>
-    <dgm:pt modelId="{AE845F5C-87E8-FA44-9FA9-B7F7F55299A0}" type="pres">
-      <dgm:prSet presAssocID="{5BC1A5C8-0A18-B14E-8794-80C61DADE11D}" presName="node" presStyleLbl="revTx" presStyleIdx="1" presStyleCnt="5">
-        <dgm:presLayoutVars>
-          <dgm:bulletEnabled val="1"/>
-        </dgm:presLayoutVars>
-      </dgm:prSet>
-      <dgm:spPr/>
-    </dgm:pt>
-    <dgm:pt modelId="{11D5EBA3-9575-934D-9193-FC9887D5852C}" type="pres">
-      <dgm:prSet presAssocID="{A8080CA6-9EB8-2B4B-A6DE-059A8AC104D7}" presName="sibTrans" presStyleLbl="node1" presStyleIdx="1" presStyleCnt="5"/>
+      <dgm:prSet presAssocID="{46DB9A69-0CBC-ED49-AF25-E8862FB25D62}" presName="sibTrans" presStyleLbl="node1" presStyleIdx="0" presStyleCnt="4"/>
       <dgm:spPr/>
     </dgm:pt>
     <dgm:pt modelId="{833B0827-59B7-6045-9067-4E09B40604FA}" type="pres">
@@ -1094,7 +1048,7 @@
       <dgm:spPr/>
     </dgm:pt>
     <dgm:pt modelId="{33287B9E-D9AA-6140-AC77-F7B78E4F9540}" type="pres">
-      <dgm:prSet presAssocID="{CA75FAB5-80C1-6B43-B922-6457C335130C}" presName="node" presStyleLbl="revTx" presStyleIdx="2" presStyleCnt="5">
+      <dgm:prSet presAssocID="{CA75FAB5-80C1-6B43-B922-6457C335130C}" presName="node" presStyleLbl="revTx" presStyleIdx="1" presStyleCnt="4">
         <dgm:presLayoutVars>
           <dgm:bulletEnabled val="1"/>
         </dgm:presLayoutVars>
@@ -1102,7 +1056,7 @@
       <dgm:spPr/>
     </dgm:pt>
     <dgm:pt modelId="{A61A73F0-7167-B245-B12A-55C3C807071E}" type="pres">
-      <dgm:prSet presAssocID="{95102F62-2367-F047-B7AC-DA5B4FA76F99}" presName="sibTrans" presStyleLbl="node1" presStyleIdx="2" presStyleCnt="5"/>
+      <dgm:prSet presAssocID="{95102F62-2367-F047-B7AC-DA5B4FA76F99}" presName="sibTrans" presStyleLbl="node1" presStyleIdx="1" presStyleCnt="4"/>
       <dgm:spPr/>
     </dgm:pt>
     <dgm:pt modelId="{BE487D54-2E55-5743-8227-A8E82C85E88A}" type="pres">
@@ -1110,7 +1064,7 @@
       <dgm:spPr/>
     </dgm:pt>
     <dgm:pt modelId="{4F6F24DC-C3CF-C646-B9BA-4E47E0546343}" type="pres">
-      <dgm:prSet presAssocID="{DC031D5B-E119-3742-BF91-36D68E55EACE}" presName="node" presStyleLbl="revTx" presStyleIdx="3" presStyleCnt="5">
+      <dgm:prSet presAssocID="{DC031D5B-E119-3742-BF91-36D68E55EACE}" presName="node" presStyleLbl="revTx" presStyleIdx="2" presStyleCnt="4">
         <dgm:presLayoutVars>
           <dgm:bulletEnabled val="1"/>
         </dgm:presLayoutVars>
@@ -1118,7 +1072,7 @@
       <dgm:spPr/>
     </dgm:pt>
     <dgm:pt modelId="{95666F8E-8A2E-E840-AA57-C37DD2CF6258}" type="pres">
-      <dgm:prSet presAssocID="{DD123EBF-A889-1941-8154-B36A5C677300}" presName="sibTrans" presStyleLbl="node1" presStyleIdx="3" presStyleCnt="5"/>
+      <dgm:prSet presAssocID="{DD123EBF-A889-1941-8154-B36A5C677300}" presName="sibTrans" presStyleLbl="node1" presStyleIdx="2" presStyleCnt="4"/>
       <dgm:spPr/>
     </dgm:pt>
     <dgm:pt modelId="{A3F9D146-8426-194D-B05C-FB8D1370AB60}" type="pres">
@@ -1126,7 +1080,7 @@
       <dgm:spPr/>
     </dgm:pt>
     <dgm:pt modelId="{9703F69B-25D5-AC4B-8FD4-930709D37941}" type="pres">
-      <dgm:prSet presAssocID="{7551A190-F129-8E4C-AD00-E5C6BE37AD16}" presName="node" presStyleLbl="revTx" presStyleIdx="4" presStyleCnt="5">
+      <dgm:prSet presAssocID="{7551A190-F129-8E4C-AD00-E5C6BE37AD16}" presName="node" presStyleLbl="revTx" presStyleIdx="3" presStyleCnt="4">
         <dgm:presLayoutVars>
           <dgm:bulletEnabled val="1"/>
         </dgm:presLayoutVars>
@@ -1134,42 +1088,36 @@
       <dgm:spPr/>
     </dgm:pt>
     <dgm:pt modelId="{A4E9E196-566E-2F4B-BE80-33147DBEA66B}" type="pres">
-      <dgm:prSet presAssocID="{4A06C0B0-1F37-3E4D-A19D-C951B1A7EBE1}" presName="sibTrans" presStyleLbl="node1" presStyleIdx="4" presStyleCnt="5"/>
+      <dgm:prSet presAssocID="{4A06C0B0-1F37-3E4D-A19D-C951B1A7EBE1}" presName="sibTrans" presStyleLbl="node1" presStyleIdx="3" presStyleCnt="4"/>
       <dgm:spPr/>
     </dgm:pt>
   </dgm:ptLst>
   <dgm:cxnLst>
     <dgm:cxn modelId="{2C91260D-801A-7A4A-AF24-66FC406A6E7A}" type="presOf" srcId="{95102F62-2367-F047-B7AC-DA5B4FA76F99}" destId="{A61A73F0-7167-B245-B12A-55C3C807071E}" srcOrd="0" destOrd="0" presId="urn:microsoft.com/office/officeart/2005/8/layout/cycle1"/>
     <dgm:cxn modelId="{B0CE5C10-6AEA-A34F-B945-79AD7930D96B}" type="presOf" srcId="{DC031D5B-E119-3742-BF91-36D68E55EACE}" destId="{4F6F24DC-C3CF-C646-B9BA-4E47E0546343}" srcOrd="0" destOrd="0" presId="urn:microsoft.com/office/officeart/2005/8/layout/cycle1"/>
-    <dgm:cxn modelId="{2D209726-7ADD-184D-9AF5-8C60F7E0F7FE}" srcId="{4CFDC3F2-4F20-B947-870C-4726F84ACDA0}" destId="{7551A190-F129-8E4C-AD00-E5C6BE37AD16}" srcOrd="4" destOrd="0" parTransId="{46DF074F-53D2-2A4C-9B59-59B4297E1578}" sibTransId="{4A06C0B0-1F37-3E4D-A19D-C951B1A7EBE1}"/>
+    <dgm:cxn modelId="{2D209726-7ADD-184D-9AF5-8C60F7E0F7FE}" srcId="{4CFDC3F2-4F20-B947-870C-4726F84ACDA0}" destId="{7551A190-F129-8E4C-AD00-E5C6BE37AD16}" srcOrd="3" destOrd="0" parTransId="{46DF074F-53D2-2A4C-9B59-59B4297E1578}" sibTransId="{4A06C0B0-1F37-3E4D-A19D-C951B1A7EBE1}"/>
     <dgm:cxn modelId="{3DCE953A-4576-F04B-A526-37AED291E179}" type="presOf" srcId="{4CFDC3F2-4F20-B947-870C-4726F84ACDA0}" destId="{3C3C7953-99F1-7E44-B472-1D68E9924009}" srcOrd="0" destOrd="0" presId="urn:microsoft.com/office/officeart/2005/8/layout/cycle1"/>
-    <dgm:cxn modelId="{7B8DD975-0B41-A248-8A5B-0484A53359A8}" srcId="{4CFDC3F2-4F20-B947-870C-4726F84ACDA0}" destId="{CA75FAB5-80C1-6B43-B922-6457C335130C}" srcOrd="2" destOrd="0" parTransId="{3B0F9BB3-BC2D-354B-8FEE-1E2961A95D9B}" sibTransId="{95102F62-2367-F047-B7AC-DA5B4FA76F99}"/>
+    <dgm:cxn modelId="{7B8DD975-0B41-A248-8A5B-0484A53359A8}" srcId="{4CFDC3F2-4F20-B947-870C-4726F84ACDA0}" destId="{CA75FAB5-80C1-6B43-B922-6457C335130C}" srcOrd="1" destOrd="0" parTransId="{3B0F9BB3-BC2D-354B-8FEE-1E2961A95D9B}" sibTransId="{95102F62-2367-F047-B7AC-DA5B4FA76F99}"/>
     <dgm:cxn modelId="{89262C76-2BE0-AA4F-AD51-33E1838DCEE8}" srcId="{4CFDC3F2-4F20-B947-870C-4726F84ACDA0}" destId="{8E718B6B-40DE-A44D-A489-81C09F33CFD3}" srcOrd="0" destOrd="0" parTransId="{4C69A5B0-9B97-1B4A-83AE-33D1F2E43804}" sibTransId="{46DB9A69-0CBC-ED49-AF25-E8862FB25D62}"/>
-    <dgm:cxn modelId="{EA7C5F91-12E5-5546-B203-41B10430F182}" type="presOf" srcId="{A8080CA6-9EB8-2B4B-A6DE-059A8AC104D7}" destId="{11D5EBA3-9575-934D-9193-FC9887D5852C}" srcOrd="0" destOrd="0" presId="urn:microsoft.com/office/officeart/2005/8/layout/cycle1"/>
     <dgm:cxn modelId="{2C90879A-6A97-1F44-89E7-CCE69CBF29C2}" type="presOf" srcId="{CA75FAB5-80C1-6B43-B922-6457C335130C}" destId="{33287B9E-D9AA-6140-AC77-F7B78E4F9540}" srcOrd="0" destOrd="0" presId="urn:microsoft.com/office/officeart/2005/8/layout/cycle1"/>
     <dgm:cxn modelId="{490B18B1-FA72-E746-908F-C56FF538F0E8}" type="presOf" srcId="{8E718B6B-40DE-A44D-A489-81C09F33CFD3}" destId="{553E1117-A267-9443-9223-EEBC6F53ED3E}" srcOrd="0" destOrd="0" presId="urn:microsoft.com/office/officeart/2005/8/layout/cycle1"/>
     <dgm:cxn modelId="{866EDBB1-DF92-5C4A-B4CD-EA55D7BFDA30}" type="presOf" srcId="{DD123EBF-A889-1941-8154-B36A5C677300}" destId="{95666F8E-8A2E-E840-AA57-C37DD2CF6258}" srcOrd="0" destOrd="0" presId="urn:microsoft.com/office/officeart/2005/8/layout/cycle1"/>
     <dgm:cxn modelId="{3B53C7B4-3CF3-F047-8815-13464F7FBA9C}" type="presOf" srcId="{7551A190-F129-8E4C-AD00-E5C6BE37AD16}" destId="{9703F69B-25D5-AC4B-8FD4-930709D37941}" srcOrd="0" destOrd="0" presId="urn:microsoft.com/office/officeart/2005/8/layout/cycle1"/>
     <dgm:cxn modelId="{6E0986C5-D7EA-C048-A648-2BF35456335E}" type="presOf" srcId="{46DB9A69-0CBC-ED49-AF25-E8862FB25D62}" destId="{02F02D4F-0F07-9944-B84B-74C90483ACE7}" srcOrd="0" destOrd="0" presId="urn:microsoft.com/office/officeart/2005/8/layout/cycle1"/>
-    <dgm:cxn modelId="{59F99CD3-245E-7C4B-A303-FF6BBBD40E78}" srcId="{4CFDC3F2-4F20-B947-870C-4726F84ACDA0}" destId="{DC031D5B-E119-3742-BF91-36D68E55EACE}" srcOrd="3" destOrd="0" parTransId="{D0E67DB5-C571-F740-AE0F-DFBC26CC625B}" sibTransId="{DD123EBF-A889-1941-8154-B36A5C677300}"/>
-    <dgm:cxn modelId="{ADA38BE6-5C1D-3244-8595-0E38D76A6E6F}" srcId="{4CFDC3F2-4F20-B947-870C-4726F84ACDA0}" destId="{5BC1A5C8-0A18-B14E-8794-80C61DADE11D}" srcOrd="1" destOrd="0" parTransId="{F9316EC7-31FE-5B40-9536-153D2F7DFA04}" sibTransId="{A8080CA6-9EB8-2B4B-A6DE-059A8AC104D7}"/>
+    <dgm:cxn modelId="{59F99CD3-245E-7C4B-A303-FF6BBBD40E78}" srcId="{4CFDC3F2-4F20-B947-870C-4726F84ACDA0}" destId="{DC031D5B-E119-3742-BF91-36D68E55EACE}" srcOrd="2" destOrd="0" parTransId="{D0E67DB5-C571-F740-AE0F-DFBC26CC625B}" sibTransId="{DD123EBF-A889-1941-8154-B36A5C677300}"/>
     <dgm:cxn modelId="{CA4D0BFE-F888-B242-8BE3-A24902D494FE}" type="presOf" srcId="{4A06C0B0-1F37-3E4D-A19D-C951B1A7EBE1}" destId="{A4E9E196-566E-2F4B-BE80-33147DBEA66B}" srcOrd="0" destOrd="0" presId="urn:microsoft.com/office/officeart/2005/8/layout/cycle1"/>
-    <dgm:cxn modelId="{0B09A4FE-270B-704E-AF9D-88A830851F9B}" type="presOf" srcId="{5BC1A5C8-0A18-B14E-8794-80C61DADE11D}" destId="{AE845F5C-87E8-FA44-9FA9-B7F7F55299A0}" srcOrd="0" destOrd="0" presId="urn:microsoft.com/office/officeart/2005/8/layout/cycle1"/>
     <dgm:cxn modelId="{880264CB-7DA0-EE4B-BF3F-22F14BCA832B}" type="presParOf" srcId="{3C3C7953-99F1-7E44-B472-1D68E9924009}" destId="{2FE07A19-85D5-D043-B932-E2802BAE4BF8}" srcOrd="0" destOrd="0" presId="urn:microsoft.com/office/officeart/2005/8/layout/cycle1"/>
     <dgm:cxn modelId="{BA13ADDD-B70A-7F42-B958-F2E947A36DD1}" type="presParOf" srcId="{3C3C7953-99F1-7E44-B472-1D68E9924009}" destId="{553E1117-A267-9443-9223-EEBC6F53ED3E}" srcOrd="1" destOrd="0" presId="urn:microsoft.com/office/officeart/2005/8/layout/cycle1"/>
     <dgm:cxn modelId="{88B9699F-7A35-A240-A62F-DD4A026EED42}" type="presParOf" srcId="{3C3C7953-99F1-7E44-B472-1D68E9924009}" destId="{02F02D4F-0F07-9944-B84B-74C90483ACE7}" srcOrd="2" destOrd="0" presId="urn:microsoft.com/office/officeart/2005/8/layout/cycle1"/>
-    <dgm:cxn modelId="{B6716DCB-E508-DD43-976B-C487ABAA888E}" type="presParOf" srcId="{3C3C7953-99F1-7E44-B472-1D68E9924009}" destId="{34356846-7B9F-074C-B88D-6972027ED9CD}" srcOrd="3" destOrd="0" presId="urn:microsoft.com/office/officeart/2005/8/layout/cycle1"/>
-    <dgm:cxn modelId="{9CC82D5B-6A60-2A44-8AF0-4937309A7CA6}" type="presParOf" srcId="{3C3C7953-99F1-7E44-B472-1D68E9924009}" destId="{AE845F5C-87E8-FA44-9FA9-B7F7F55299A0}" srcOrd="4" destOrd="0" presId="urn:microsoft.com/office/officeart/2005/8/layout/cycle1"/>
-    <dgm:cxn modelId="{6027EE20-7232-A949-ACDF-D4D9184D22CB}" type="presParOf" srcId="{3C3C7953-99F1-7E44-B472-1D68E9924009}" destId="{11D5EBA3-9575-934D-9193-FC9887D5852C}" srcOrd="5" destOrd="0" presId="urn:microsoft.com/office/officeart/2005/8/layout/cycle1"/>
-    <dgm:cxn modelId="{B07A0EC7-0A75-3646-BE02-2383BBE60E3E}" type="presParOf" srcId="{3C3C7953-99F1-7E44-B472-1D68E9924009}" destId="{833B0827-59B7-6045-9067-4E09B40604FA}" srcOrd="6" destOrd="0" presId="urn:microsoft.com/office/officeart/2005/8/layout/cycle1"/>
-    <dgm:cxn modelId="{73688F1F-CAB7-3E42-8813-FB4CCEBDDC50}" type="presParOf" srcId="{3C3C7953-99F1-7E44-B472-1D68E9924009}" destId="{33287B9E-D9AA-6140-AC77-F7B78E4F9540}" srcOrd="7" destOrd="0" presId="urn:microsoft.com/office/officeart/2005/8/layout/cycle1"/>
-    <dgm:cxn modelId="{4CF13941-63A5-0643-BDB5-1AD0B52D5DCB}" type="presParOf" srcId="{3C3C7953-99F1-7E44-B472-1D68E9924009}" destId="{A61A73F0-7167-B245-B12A-55C3C807071E}" srcOrd="8" destOrd="0" presId="urn:microsoft.com/office/officeart/2005/8/layout/cycle1"/>
-    <dgm:cxn modelId="{96B3751C-9A4F-BF4C-9693-1BB7137EE4AE}" type="presParOf" srcId="{3C3C7953-99F1-7E44-B472-1D68E9924009}" destId="{BE487D54-2E55-5743-8227-A8E82C85E88A}" srcOrd="9" destOrd="0" presId="urn:microsoft.com/office/officeart/2005/8/layout/cycle1"/>
-    <dgm:cxn modelId="{423E5B76-7D2E-5C4C-B6B4-3E1B639525FC}" type="presParOf" srcId="{3C3C7953-99F1-7E44-B472-1D68E9924009}" destId="{4F6F24DC-C3CF-C646-B9BA-4E47E0546343}" srcOrd="10" destOrd="0" presId="urn:microsoft.com/office/officeart/2005/8/layout/cycle1"/>
-    <dgm:cxn modelId="{CCEFB782-A1BC-744D-91E4-B868966B6CE0}" type="presParOf" srcId="{3C3C7953-99F1-7E44-B472-1D68E9924009}" destId="{95666F8E-8A2E-E840-AA57-C37DD2CF6258}" srcOrd="11" destOrd="0" presId="urn:microsoft.com/office/officeart/2005/8/layout/cycle1"/>
-    <dgm:cxn modelId="{2CCD5F79-E7D7-9541-B542-D531C59EC8D2}" type="presParOf" srcId="{3C3C7953-99F1-7E44-B472-1D68E9924009}" destId="{A3F9D146-8426-194D-B05C-FB8D1370AB60}" srcOrd="12" destOrd="0" presId="urn:microsoft.com/office/officeart/2005/8/layout/cycle1"/>
-    <dgm:cxn modelId="{2330EAB8-7C56-7B42-A353-5767B0AE573B}" type="presParOf" srcId="{3C3C7953-99F1-7E44-B472-1D68E9924009}" destId="{9703F69B-25D5-AC4B-8FD4-930709D37941}" srcOrd="13" destOrd="0" presId="urn:microsoft.com/office/officeart/2005/8/layout/cycle1"/>
-    <dgm:cxn modelId="{AD1435BE-9D52-FD40-8F69-3E1C7CA04623}" type="presParOf" srcId="{3C3C7953-99F1-7E44-B472-1D68E9924009}" destId="{A4E9E196-566E-2F4B-BE80-33147DBEA66B}" srcOrd="14" destOrd="0" presId="urn:microsoft.com/office/officeart/2005/8/layout/cycle1"/>
+    <dgm:cxn modelId="{B07A0EC7-0A75-3646-BE02-2383BBE60E3E}" type="presParOf" srcId="{3C3C7953-99F1-7E44-B472-1D68E9924009}" destId="{833B0827-59B7-6045-9067-4E09B40604FA}" srcOrd="3" destOrd="0" presId="urn:microsoft.com/office/officeart/2005/8/layout/cycle1"/>
+    <dgm:cxn modelId="{73688F1F-CAB7-3E42-8813-FB4CCEBDDC50}" type="presParOf" srcId="{3C3C7953-99F1-7E44-B472-1D68E9924009}" destId="{33287B9E-D9AA-6140-AC77-F7B78E4F9540}" srcOrd="4" destOrd="0" presId="urn:microsoft.com/office/officeart/2005/8/layout/cycle1"/>
+    <dgm:cxn modelId="{4CF13941-63A5-0643-BDB5-1AD0B52D5DCB}" type="presParOf" srcId="{3C3C7953-99F1-7E44-B472-1D68E9924009}" destId="{A61A73F0-7167-B245-B12A-55C3C807071E}" srcOrd="5" destOrd="0" presId="urn:microsoft.com/office/officeart/2005/8/layout/cycle1"/>
+    <dgm:cxn modelId="{96B3751C-9A4F-BF4C-9693-1BB7137EE4AE}" type="presParOf" srcId="{3C3C7953-99F1-7E44-B472-1D68E9924009}" destId="{BE487D54-2E55-5743-8227-A8E82C85E88A}" srcOrd="6" destOrd="0" presId="urn:microsoft.com/office/officeart/2005/8/layout/cycle1"/>
+    <dgm:cxn modelId="{423E5B76-7D2E-5C4C-B6B4-3E1B639525FC}" type="presParOf" srcId="{3C3C7953-99F1-7E44-B472-1D68E9924009}" destId="{4F6F24DC-C3CF-C646-B9BA-4E47E0546343}" srcOrd="7" destOrd="0" presId="urn:microsoft.com/office/officeart/2005/8/layout/cycle1"/>
+    <dgm:cxn modelId="{CCEFB782-A1BC-744D-91E4-B868966B6CE0}" type="presParOf" srcId="{3C3C7953-99F1-7E44-B472-1D68E9924009}" destId="{95666F8E-8A2E-E840-AA57-C37DD2CF6258}" srcOrd="8" destOrd="0" presId="urn:microsoft.com/office/officeart/2005/8/layout/cycle1"/>
+    <dgm:cxn modelId="{2CCD5F79-E7D7-9541-B542-D531C59EC8D2}" type="presParOf" srcId="{3C3C7953-99F1-7E44-B472-1D68E9924009}" destId="{A3F9D146-8426-194D-B05C-FB8D1370AB60}" srcOrd="9" destOrd="0" presId="urn:microsoft.com/office/officeart/2005/8/layout/cycle1"/>
+    <dgm:cxn modelId="{2330EAB8-7C56-7B42-A353-5767B0AE573B}" type="presParOf" srcId="{3C3C7953-99F1-7E44-B472-1D68E9924009}" destId="{9703F69B-25D5-AC4B-8FD4-930709D37941}" srcOrd="10" destOrd="0" presId="urn:microsoft.com/office/officeart/2005/8/layout/cycle1"/>
+    <dgm:cxn modelId="{AD1435BE-9D52-FD40-8F69-3E1C7CA04623}" type="presParOf" srcId="{3C3C7953-99F1-7E44-B472-1D68E9924009}" destId="{A4E9E196-566E-2F4B-BE80-33147DBEA66B}" srcOrd="11" destOrd="0" presId="urn:microsoft.com/office/officeart/2005/8/layout/cycle1"/>
   </dgm:cxnLst>
   <dgm:bg/>
   <dgm:whole/>
@@ -1196,8 +1144,8 @@
       </dsp:nvSpPr>
       <dsp:spPr>
         <a:xfrm>
-          <a:off x="4704665" y="39140"/>
-          <a:ext cx="1341437" cy="1341437"/>
+          <a:off x="4735144" y="121283"/>
+          <a:ext cx="1916906" cy="1916906"/>
         </a:xfrm>
         <a:prstGeom prst="rect">
           <a:avLst/>
@@ -1221,12 +1169,12 @@
         <a:fontRef idx="minor"/>
       </dsp:style>
       <dsp:txBody>
-        <a:bodyPr spcFirstLastPara="0" vert="horz" wrap="square" lIns="26670" tIns="26670" rIns="26670" bIns="26670" numCol="1" spcCol="1270" anchor="ctr" anchorCtr="0">
+        <a:bodyPr spcFirstLastPara="0" vert="horz" wrap="square" lIns="33020" tIns="33020" rIns="33020" bIns="33020" numCol="1" spcCol="1270" anchor="ctr" anchorCtr="0">
           <a:noAutofit/>
         </a:bodyPr>
         <a:lstStyle/>
         <a:p>
-          <a:pPr marL="0" lvl="0" indent="0" algn="ctr" defTabSz="933450">
+          <a:pPr marL="0" lvl="0" indent="0" algn="ctr" defTabSz="1155700">
             <a:lnSpc>
               <a:spcPct val="90000"/>
             </a:lnSpc>
@@ -1239,14 +1187,14 @@
             <a:buNone/>
           </a:pPr>
           <a:r>
-            <a:rPr lang="en-US" sz="2100" kern="1200" dirty="0"/>
-            <a:t>Warning</a:t>
+            <a:rPr lang="en-US" sz="2600" kern="1200" dirty="0"/>
+            <a:t>Preparedness</a:t>
           </a:r>
         </a:p>
       </dsp:txBody>
       <dsp:txXfrm>
-        <a:off x="4704665" y="39140"/>
-        <a:ext cx="1341437" cy="1341437"/>
+        <a:off x="4735144" y="121283"/>
+        <a:ext cx="1916906" cy="1916906"/>
       </dsp:txXfrm>
     </dsp:sp>
     <dsp:sp modelId="{02F02D4F-0F07-9944-B84B-74C90483ACE7}">
@@ -1256,161 +1204,16 @@
       </dsp:nvSpPr>
       <dsp:spPr>
         <a:xfrm>
-          <a:off x="1549560" y="385"/>
-          <a:ext cx="5028878" cy="5028878"/>
+          <a:off x="1354454" y="-211"/>
+          <a:ext cx="5419090" cy="5419090"/>
         </a:xfrm>
         <a:prstGeom prst="circularArrow">
           <a:avLst>
-            <a:gd name="adj1" fmla="val 5202"/>
-            <a:gd name="adj2" fmla="val 336015"/>
-            <a:gd name="adj3" fmla="val 21292825"/>
-            <a:gd name="adj4" fmla="val 19766604"/>
-            <a:gd name="adj5" fmla="val 6068"/>
-          </a:avLst>
-        </a:prstGeom>
-        <a:gradFill rotWithShape="0">
-          <a:gsLst>
-            <a:gs pos="0">
-              <a:schemeClr val="accent1">
-                <a:hueOff val="0"/>
-                <a:satOff val="0"/>
-                <a:lumOff val="0"/>
-                <a:alphaOff val="0"/>
-                <a:satMod val="103000"/>
-                <a:lumMod val="102000"/>
-                <a:tint val="94000"/>
-              </a:schemeClr>
-            </a:gs>
-            <a:gs pos="50000">
-              <a:schemeClr val="accent1">
-                <a:hueOff val="0"/>
-                <a:satOff val="0"/>
-                <a:lumOff val="0"/>
-                <a:alphaOff val="0"/>
-                <a:satMod val="110000"/>
-                <a:lumMod val="100000"/>
-                <a:shade val="100000"/>
-              </a:schemeClr>
-            </a:gs>
-            <a:gs pos="100000">
-              <a:schemeClr val="accent1">
-                <a:hueOff val="0"/>
-                <a:satOff val="0"/>
-                <a:lumOff val="0"/>
-                <a:alphaOff val="0"/>
-                <a:lumMod val="99000"/>
-                <a:satMod val="120000"/>
-                <a:shade val="78000"/>
-              </a:schemeClr>
-            </a:gs>
-          </a:gsLst>
-          <a:lin ang="5400000" scaled="0"/>
-        </a:gradFill>
-        <a:ln>
-          <a:noFill/>
-        </a:ln>
-        <a:effectLst/>
-        <a:scene3d>
-          <a:camera prst="orthographicFront"/>
-          <a:lightRig rig="flat" dir="t"/>
-        </a:scene3d>
-        <a:sp3d prstMaterial="plastic">
-          <a:bevelT w="120900" h="88900"/>
-          <a:bevelB w="88900" h="31750" prst="angle"/>
-        </a:sp3d>
-      </dsp:spPr>
-      <dsp:style>
-        <a:lnRef idx="0">
-          <a:scrgbClr r="0" g="0" b="0"/>
-        </a:lnRef>
-        <a:fillRef idx="3">
-          <a:scrgbClr r="0" g="0" b="0"/>
-        </a:fillRef>
-        <a:effectRef idx="2">
-          <a:scrgbClr r="0" g="0" b="0"/>
-        </a:effectRef>
-        <a:fontRef idx="minor">
-          <a:schemeClr val="lt1"/>
-        </a:fontRef>
-      </dsp:style>
-    </dsp:sp>
-    <dsp:sp modelId="{AE845F5C-87E8-FA44-9FA9-B7F7F55299A0}">
-      <dsp:nvSpPr>
-        <dsp:cNvPr id="0" name=""/>
-        <dsp:cNvSpPr/>
-      </dsp:nvSpPr>
-      <dsp:spPr>
-        <a:xfrm>
-          <a:off x="5515145" y="2533541"/>
-          <a:ext cx="1341437" cy="1341437"/>
-        </a:xfrm>
-        <a:prstGeom prst="rect">
-          <a:avLst/>
-        </a:prstGeom>
-        <a:noFill/>
-        <a:ln>
-          <a:noFill/>
-        </a:ln>
-        <a:effectLst/>
-      </dsp:spPr>
-      <dsp:style>
-        <a:lnRef idx="0">
-          <a:scrgbClr r="0" g="0" b="0"/>
-        </a:lnRef>
-        <a:fillRef idx="0">
-          <a:scrgbClr r="0" g="0" b="0"/>
-        </a:fillRef>
-        <a:effectRef idx="0">
-          <a:scrgbClr r="0" g="0" b="0"/>
-        </a:effectRef>
-        <a:fontRef idx="minor"/>
-      </dsp:style>
-      <dsp:txBody>
-        <a:bodyPr spcFirstLastPara="0" vert="horz" wrap="square" lIns="26670" tIns="26670" rIns="26670" bIns="26670" numCol="1" spcCol="1270" anchor="ctr" anchorCtr="0">
-          <a:noAutofit/>
-        </a:bodyPr>
-        <a:lstStyle/>
-        <a:p>
-          <a:pPr marL="0" lvl="0" indent="0" algn="ctr" defTabSz="933450">
-            <a:lnSpc>
-              <a:spcPct val="90000"/>
-            </a:lnSpc>
-            <a:spcBef>
-              <a:spcPct val="0"/>
-            </a:spcBef>
-            <a:spcAft>
-              <a:spcPct val="35000"/>
-            </a:spcAft>
-            <a:buNone/>
-          </a:pPr>
-          <a:r>
-            <a:rPr lang="en-US" sz="2100" kern="1200" dirty="0"/>
-            <a:t>Event</a:t>
-          </a:r>
-        </a:p>
-      </dsp:txBody>
-      <dsp:txXfrm>
-        <a:off x="5515145" y="2533541"/>
-        <a:ext cx="1341437" cy="1341437"/>
-      </dsp:txXfrm>
-    </dsp:sp>
-    <dsp:sp modelId="{11D5EBA3-9575-934D-9193-FC9887D5852C}">
-      <dsp:nvSpPr>
-        <dsp:cNvPr id="0" name=""/>
-        <dsp:cNvSpPr/>
-      </dsp:nvSpPr>
-      <dsp:spPr>
-        <a:xfrm>
-          <a:off x="1549560" y="385"/>
-          <a:ext cx="5028878" cy="5028878"/>
-        </a:xfrm>
-        <a:prstGeom prst="circularArrow">
-          <a:avLst>
-            <a:gd name="adj1" fmla="val 5202"/>
-            <a:gd name="adj2" fmla="val 336015"/>
-            <a:gd name="adj3" fmla="val 4014266"/>
-            <a:gd name="adj4" fmla="val 2253829"/>
-            <a:gd name="adj5" fmla="val 6068"/>
+            <a:gd name="adj1" fmla="val 6898"/>
+            <a:gd name="adj2" fmla="val 465012"/>
+            <a:gd name="adj3" fmla="val 550847"/>
+            <a:gd name="adj4" fmla="val 20584141"/>
+            <a:gd name="adj5" fmla="val 8047"/>
           </a:avLst>
         </a:prstGeom>
         <a:gradFill rotWithShape="0">
@@ -1486,8 +1289,8 @@
       </dsp:nvSpPr>
       <dsp:spPr>
         <a:xfrm>
-          <a:off x="3393281" y="4075166"/>
-          <a:ext cx="1341437" cy="1341437"/>
+          <a:off x="4735144" y="3380477"/>
+          <a:ext cx="1916906" cy="1916906"/>
         </a:xfrm>
         <a:prstGeom prst="rect">
           <a:avLst/>
@@ -1511,12 +1314,12 @@
         <a:fontRef idx="minor"/>
       </dsp:style>
       <dsp:txBody>
-        <a:bodyPr spcFirstLastPara="0" vert="horz" wrap="square" lIns="26670" tIns="26670" rIns="26670" bIns="26670" numCol="1" spcCol="1270" anchor="ctr" anchorCtr="0">
+        <a:bodyPr spcFirstLastPara="0" vert="horz" wrap="square" lIns="33020" tIns="33020" rIns="33020" bIns="33020" numCol="1" spcCol="1270" anchor="ctr" anchorCtr="0">
           <a:noAutofit/>
         </a:bodyPr>
         <a:lstStyle/>
         <a:p>
-          <a:pPr marL="0" lvl="0" indent="0" algn="ctr" defTabSz="933450">
+          <a:pPr marL="0" lvl="0" indent="0" algn="ctr" defTabSz="1155700">
             <a:lnSpc>
               <a:spcPct val="90000"/>
             </a:lnSpc>
@@ -1529,14 +1332,14 @@
             <a:buNone/>
           </a:pPr>
           <a:r>
-            <a:rPr lang="en-US" sz="2100" kern="1200" dirty="0"/>
+            <a:rPr lang="en-US" sz="2600" kern="1200" dirty="0"/>
             <a:t>Response</a:t>
           </a:r>
         </a:p>
       </dsp:txBody>
       <dsp:txXfrm>
-        <a:off x="3393281" y="4075166"/>
-        <a:ext cx="1341437" cy="1341437"/>
+        <a:off x="4735144" y="3380477"/>
+        <a:ext cx="1916906" cy="1916906"/>
       </dsp:txXfrm>
     </dsp:sp>
     <dsp:sp modelId="{A61A73F0-7167-B245-B12A-55C3C807071E}">
@@ -1546,16 +1349,16 @@
       </dsp:nvSpPr>
       <dsp:spPr>
         <a:xfrm>
-          <a:off x="1549560" y="385"/>
-          <a:ext cx="5028878" cy="5028878"/>
+          <a:off x="1354454" y="-211"/>
+          <a:ext cx="5419090" cy="5419090"/>
         </a:xfrm>
         <a:prstGeom prst="circularArrow">
           <a:avLst>
-            <a:gd name="adj1" fmla="val 5202"/>
-            <a:gd name="adj2" fmla="val 336015"/>
-            <a:gd name="adj3" fmla="val 8210155"/>
-            <a:gd name="adj4" fmla="val 6449719"/>
-            <a:gd name="adj5" fmla="val 6068"/>
+            <a:gd name="adj1" fmla="val 6898"/>
+            <a:gd name="adj2" fmla="val 465012"/>
+            <a:gd name="adj3" fmla="val 5950847"/>
+            <a:gd name="adj4" fmla="val 4384141"/>
+            <a:gd name="adj5" fmla="val 8047"/>
           </a:avLst>
         </a:prstGeom>
         <a:gradFill rotWithShape="0">
@@ -1631,8 +1434,8 @@
       </dsp:nvSpPr>
       <dsp:spPr>
         <a:xfrm>
-          <a:off x="1271416" y="2533541"/>
-          <a:ext cx="1341437" cy="1341437"/>
+          <a:off x="1475949" y="3380477"/>
+          <a:ext cx="1916906" cy="1916906"/>
         </a:xfrm>
         <a:prstGeom prst="rect">
           <a:avLst/>
@@ -1656,12 +1459,12 @@
         <a:fontRef idx="minor"/>
       </dsp:style>
       <dsp:txBody>
-        <a:bodyPr spcFirstLastPara="0" vert="horz" wrap="square" lIns="26670" tIns="26670" rIns="26670" bIns="26670" numCol="1" spcCol="1270" anchor="ctr" anchorCtr="0">
+        <a:bodyPr spcFirstLastPara="0" vert="horz" wrap="square" lIns="33020" tIns="33020" rIns="33020" bIns="33020" numCol="1" spcCol="1270" anchor="ctr" anchorCtr="0">
           <a:noAutofit/>
         </a:bodyPr>
         <a:lstStyle/>
         <a:p>
-          <a:pPr marL="0" lvl="0" indent="0" algn="ctr" defTabSz="933450">
+          <a:pPr marL="0" lvl="0" indent="0" algn="ctr" defTabSz="1155700">
             <a:lnSpc>
               <a:spcPct val="90000"/>
             </a:lnSpc>
@@ -1674,14 +1477,14 @@
             <a:buNone/>
           </a:pPr>
           <a:r>
-            <a:rPr lang="en-US" sz="2100" kern="1200" dirty="0"/>
-            <a:t>Recovery &amp; Assessment</a:t>
+            <a:rPr lang="en-US" sz="2600" kern="1200" dirty="0"/>
+            <a:t>Recovery</a:t>
           </a:r>
         </a:p>
       </dsp:txBody>
       <dsp:txXfrm>
-        <a:off x="1271416" y="2533541"/>
-        <a:ext cx="1341437" cy="1341437"/>
+        <a:off x="1475949" y="3380477"/>
+        <a:ext cx="1916906" cy="1916906"/>
       </dsp:txXfrm>
     </dsp:sp>
     <dsp:sp modelId="{95666F8E-8A2E-E840-AA57-C37DD2CF6258}">
@@ -1691,16 +1494,16 @@
       </dsp:nvSpPr>
       <dsp:spPr>
         <a:xfrm>
-          <a:off x="1549560" y="385"/>
-          <a:ext cx="5028878" cy="5028878"/>
+          <a:off x="1354454" y="-211"/>
+          <a:ext cx="5419090" cy="5419090"/>
         </a:xfrm>
         <a:prstGeom prst="circularArrow">
           <a:avLst>
-            <a:gd name="adj1" fmla="val 5202"/>
-            <a:gd name="adj2" fmla="val 336015"/>
-            <a:gd name="adj3" fmla="val 12297380"/>
-            <a:gd name="adj4" fmla="val 10771160"/>
-            <a:gd name="adj5" fmla="val 6068"/>
+            <a:gd name="adj1" fmla="val 6898"/>
+            <a:gd name="adj2" fmla="val 465012"/>
+            <a:gd name="adj3" fmla="val 11350847"/>
+            <a:gd name="adj4" fmla="val 9784141"/>
+            <a:gd name="adj5" fmla="val 8047"/>
           </a:avLst>
         </a:prstGeom>
         <a:gradFill rotWithShape="0">
@@ -1776,8 +1579,8 @@
       </dsp:nvSpPr>
       <dsp:spPr>
         <a:xfrm>
-          <a:off x="2081896" y="39140"/>
-          <a:ext cx="1341437" cy="1341437"/>
+          <a:off x="1475949" y="121283"/>
+          <a:ext cx="1916906" cy="1916906"/>
         </a:xfrm>
         <a:prstGeom prst="rect">
           <a:avLst/>
@@ -1801,12 +1604,12 @@
         <a:fontRef idx="minor"/>
       </dsp:style>
       <dsp:txBody>
-        <a:bodyPr spcFirstLastPara="0" vert="horz" wrap="square" lIns="26670" tIns="26670" rIns="26670" bIns="26670" numCol="1" spcCol="1270" anchor="ctr" anchorCtr="0">
+        <a:bodyPr spcFirstLastPara="0" vert="horz" wrap="square" lIns="33020" tIns="33020" rIns="33020" bIns="33020" numCol="1" spcCol="1270" anchor="ctr" anchorCtr="0">
           <a:noAutofit/>
         </a:bodyPr>
         <a:lstStyle/>
         <a:p>
-          <a:pPr marL="0" lvl="0" indent="0" algn="ctr" defTabSz="933450">
+          <a:pPr marL="0" lvl="0" indent="0" algn="ctr" defTabSz="1155700">
             <a:lnSpc>
               <a:spcPct val="90000"/>
             </a:lnSpc>
@@ -1819,14 +1622,14 @@
             <a:buNone/>
           </a:pPr>
           <a:r>
-            <a:rPr lang="en-US" sz="2100" kern="1200" dirty="0"/>
+            <a:rPr lang="en-US" sz="2600" kern="1200" dirty="0"/>
             <a:t>Mitigation</a:t>
           </a:r>
         </a:p>
       </dsp:txBody>
       <dsp:txXfrm>
-        <a:off x="2081896" y="39140"/>
-        <a:ext cx="1341437" cy="1341437"/>
+        <a:off x="1475949" y="121283"/>
+        <a:ext cx="1916906" cy="1916906"/>
       </dsp:txXfrm>
     </dsp:sp>
     <dsp:sp modelId="{A4E9E196-566E-2F4B-BE80-33147DBEA66B}">
@@ -1836,16 +1639,16 @@
       </dsp:nvSpPr>
       <dsp:spPr>
         <a:xfrm>
-          <a:off x="1549560" y="385"/>
-          <a:ext cx="5028878" cy="5028878"/>
+          <a:off x="1354454" y="-211"/>
+          <a:ext cx="5419090" cy="5419090"/>
         </a:xfrm>
         <a:prstGeom prst="circularArrow">
           <a:avLst>
-            <a:gd name="adj1" fmla="val 5202"/>
-            <a:gd name="adj2" fmla="val 336015"/>
-            <a:gd name="adj3" fmla="val 16865256"/>
-            <a:gd name="adj4" fmla="val 15198729"/>
-            <a:gd name="adj5" fmla="val 6068"/>
+            <a:gd name="adj1" fmla="val 6898"/>
+            <a:gd name="adj2" fmla="val 465012"/>
+            <a:gd name="adj3" fmla="val 16750847"/>
+            <a:gd name="adj4" fmla="val 15184141"/>
+            <a:gd name="adj5" fmla="val 8047"/>
           </a:avLst>
         </a:prstGeom>
         <a:gradFill rotWithShape="0">
@@ -3380,7 +3183,7 @@
           <a:p>
             <a:fld id="{9F3A6B9E-E8A5-9742-94D3-3C8CAC27DEA2}" type="datetimeFigureOut">
               <a:rPr lang="en-US" smtClean="0"/>
-              <a:t>6/3/19</a:t>
+              <a:t>6/7/19</a:t>
             </a:fld>
             <a:endParaRPr lang="en-US"/>
           </a:p>
@@ -3578,7 +3381,7 @@
           <a:p>
             <a:fld id="{9F3A6B9E-E8A5-9742-94D3-3C8CAC27DEA2}" type="datetimeFigureOut">
               <a:rPr lang="en-US" smtClean="0"/>
-              <a:t>6/3/19</a:t>
+              <a:t>6/7/19</a:t>
             </a:fld>
             <a:endParaRPr lang="en-US"/>
           </a:p>
@@ -3786,7 +3589,7 @@
           <a:p>
             <a:fld id="{9F3A6B9E-E8A5-9742-94D3-3C8CAC27DEA2}" type="datetimeFigureOut">
               <a:rPr lang="en-US" smtClean="0"/>
-              <a:t>6/3/19</a:t>
+              <a:t>6/7/19</a:t>
             </a:fld>
             <a:endParaRPr lang="en-US"/>
           </a:p>
@@ -3984,7 +3787,7 @@
           <a:p>
             <a:fld id="{9F3A6B9E-E8A5-9742-94D3-3C8CAC27DEA2}" type="datetimeFigureOut">
               <a:rPr lang="en-US" smtClean="0"/>
-              <a:t>6/3/19</a:t>
+              <a:t>6/7/19</a:t>
             </a:fld>
             <a:endParaRPr lang="en-US"/>
           </a:p>
@@ -4259,7 +4062,7 @@
           <a:p>
             <a:fld id="{9F3A6B9E-E8A5-9742-94D3-3C8CAC27DEA2}" type="datetimeFigureOut">
               <a:rPr lang="en-US" smtClean="0"/>
-              <a:t>6/3/19</a:t>
+              <a:t>6/7/19</a:t>
             </a:fld>
             <a:endParaRPr lang="en-US"/>
           </a:p>
@@ -4524,7 +4327,7 @@
           <a:p>
             <a:fld id="{9F3A6B9E-E8A5-9742-94D3-3C8CAC27DEA2}" type="datetimeFigureOut">
               <a:rPr lang="en-US" smtClean="0"/>
-              <a:t>6/3/19</a:t>
+              <a:t>6/7/19</a:t>
             </a:fld>
             <a:endParaRPr lang="en-US"/>
           </a:p>
@@ -4936,7 +4739,7 @@
           <a:p>
             <a:fld id="{9F3A6B9E-E8A5-9742-94D3-3C8CAC27DEA2}" type="datetimeFigureOut">
               <a:rPr lang="en-US" smtClean="0"/>
-              <a:t>6/3/19</a:t>
+              <a:t>6/7/19</a:t>
             </a:fld>
             <a:endParaRPr lang="en-US"/>
           </a:p>
@@ -5077,7 +4880,7 @@
           <a:p>
             <a:fld id="{9F3A6B9E-E8A5-9742-94D3-3C8CAC27DEA2}" type="datetimeFigureOut">
               <a:rPr lang="en-US" smtClean="0"/>
-              <a:t>6/3/19</a:t>
+              <a:t>6/7/19</a:t>
             </a:fld>
             <a:endParaRPr lang="en-US"/>
           </a:p>
@@ -5190,7 +4993,7 @@
           <a:p>
             <a:fld id="{9F3A6B9E-E8A5-9742-94D3-3C8CAC27DEA2}" type="datetimeFigureOut">
               <a:rPr lang="en-US" smtClean="0"/>
-              <a:t>6/3/19</a:t>
+              <a:t>6/7/19</a:t>
             </a:fld>
             <a:endParaRPr lang="en-US"/>
           </a:p>
@@ -5501,7 +5304,7 @@
           <a:p>
             <a:fld id="{9F3A6B9E-E8A5-9742-94D3-3C8CAC27DEA2}" type="datetimeFigureOut">
               <a:rPr lang="en-US" smtClean="0"/>
-              <a:t>6/3/19</a:t>
+              <a:t>6/7/19</a:t>
             </a:fld>
             <a:endParaRPr lang="en-US"/>
           </a:p>
@@ -5789,7 +5592,7 @@
           <a:p>
             <a:fld id="{9F3A6B9E-E8A5-9742-94D3-3C8CAC27DEA2}" type="datetimeFigureOut">
               <a:rPr lang="en-US" smtClean="0"/>
-              <a:t>6/3/19</a:t>
+              <a:t>6/7/19</a:t>
             </a:fld>
             <a:endParaRPr lang="en-US"/>
           </a:p>
@@ -6030,7 +5833,7 @@
           <a:p>
             <a:fld id="{9F3A6B9E-E8A5-9742-94D3-3C8CAC27DEA2}" type="datetimeFigureOut">
               <a:rPr lang="en-US" smtClean="0"/>
-              <a:t>6/3/19</a:t>
+              <a:t>6/7/19</a:t>
             </a:fld>
             <a:endParaRPr lang="en-US"/>
           </a:p>
@@ -6460,7 +6263,7 @@
           <p:nvPr>
             <p:extLst>
               <p:ext uri="{D42A27DB-BD31-4B8C-83A1-F6EECF244321}">
-                <p14:modId xmlns:p14="http://schemas.microsoft.com/office/powerpoint/2010/main" val="1909224826"/>
+                <p14:modId xmlns:p14="http://schemas.microsoft.com/office/powerpoint/2010/main" val="2486649065"/>
               </p:ext>
             </p:extLst>
           </p:nvPr>
@@ -6479,6 +6282,92 @@
     <p:extLst>
       <p:ext uri="{BB962C8B-B14F-4D97-AF65-F5344CB8AC3E}">
         <p14:creationId xmlns:p14="http://schemas.microsoft.com/office/powerpoint/2010/main" val="2430331486"/>
+      </p:ext>
+    </p:extLst>
+  </p:cSld>
+  <p:clrMapOvr>
+    <a:masterClrMapping/>
+  </p:clrMapOvr>
+</p:sld>
+</file>
+
+<file path=ppt/slides/slide2.xml><?xml version="1.0" encoding="utf-8"?>
+<p:sld xmlns:a="http://schemas.openxmlformats.org/drawingml/2006/main" xmlns:r="http://schemas.openxmlformats.org/officeDocument/2006/relationships" xmlns:p="http://schemas.openxmlformats.org/presentationml/2006/main">
+  <p:cSld>
+    <p:spTree>
+      <p:nvGrpSpPr>
+        <p:cNvPr id="1" name=""/>
+        <p:cNvGrpSpPr/>
+        <p:nvPr/>
+      </p:nvGrpSpPr>
+      <p:grpSpPr>
+        <a:xfrm>
+          <a:off x="0" y="0"/>
+          <a:ext cx="0" cy="0"/>
+          <a:chOff x="0" y="0"/>
+          <a:chExt cx="0" cy="0"/>
+        </a:xfrm>
+      </p:grpSpPr>
+      <p:sp>
+        <p:nvSpPr>
+          <p:cNvPr id="4" name="Rectangle 3">
+            <a:extLst>
+              <a:ext uri="{FF2B5EF4-FFF2-40B4-BE49-F238E27FC236}">
+                <a16:creationId xmlns:a16="http://schemas.microsoft.com/office/drawing/2014/main" id="{2E2F3CBF-227B-C64F-B08B-68B809F84D9C}"/>
+              </a:ext>
+            </a:extLst>
+          </p:cNvPr>
+          <p:cNvSpPr/>
+          <p:nvPr/>
+        </p:nvSpPr>
+        <p:spPr>
+          <a:xfrm rot="19878863">
+            <a:off x="2448910" y="2091559"/>
+            <a:ext cx="8103476" cy="1555531"/>
+          </a:xfrm>
+          <a:prstGeom prst="rect">
+            <a:avLst/>
+          </a:prstGeom>
+        </p:spPr>
+        <p:style>
+          <a:lnRef idx="2">
+            <a:schemeClr val="accent1">
+              <a:shade val="50000"/>
+            </a:schemeClr>
+          </a:lnRef>
+          <a:fillRef idx="1">
+            <a:schemeClr val="accent1"/>
+          </a:fillRef>
+          <a:effectRef idx="0">
+            <a:schemeClr val="accent1"/>
+          </a:effectRef>
+          <a:fontRef idx="minor">
+            <a:schemeClr val="lt1"/>
+          </a:fontRef>
+        </p:style>
+        <p:txBody>
+          <a:bodyPr rtlCol="0" anchor="ctr"/>
+          <a:lstStyle/>
+          <a:p>
+            <a:pPr algn="ctr"/>
+            <a:r>
+              <a:rPr lang="en-US" sz="4000" dirty="0"/>
+              <a:t>Architecture </a:t>
+            </a:r>
+          </a:p>
+          <a:p>
+            <a:pPr algn="ctr"/>
+            <a:r>
+              <a:rPr lang="en-US" sz="4000" dirty="0"/>
+              <a:t>Placeholder</a:t>
+            </a:r>
+          </a:p>
+        </p:txBody>
+      </p:sp>
+    </p:spTree>
+    <p:extLst>
+      <p:ext uri="{BB962C8B-B14F-4D97-AF65-F5344CB8AC3E}">
+        <p14:creationId xmlns:p14="http://schemas.microsoft.com/office/powerpoint/2010/main" val="1664845298"/>
       </p:ext>
     </p:extLst>
   </p:cSld>

</xml_diff>